<commit_message>
Remove amortized word on L16 slides
</commit_message>
<xml_diff>
--- a/slides/L16_hashing.pptx
+++ b/slides/L16_hashing.pptx
@@ -241,7 +241,7 @@
           <a:p>
             <a:fld id="{9682EFDA-C24D-4F7B-8BE4-7BEA577B4213}" type="datetimeFigureOut">
               <a:rPr lang="en-US" smtClean="0"/>
-              <a:t>7/18/24</a:t>
+              <a:t>7/19/2024</a:t>
             </a:fld>
             <a:endParaRPr lang="en-US"/>
           </a:p>
@@ -901,7 +901,7 @@
           <a:p>
             <a:fld id="{E45D970C-F8D1-4E69-B2C1-46B399D34E86}" type="datetimeFigureOut">
               <a:rPr lang="en-US" smtClean="0"/>
-              <a:t>7/18/24</a:t>
+              <a:t>7/19/2024</a:t>
             </a:fld>
             <a:endParaRPr lang="en-US"/>
           </a:p>
@@ -1099,7 +1099,7 @@
           <a:p>
             <a:fld id="{E45D970C-F8D1-4E69-B2C1-46B399D34E86}" type="datetimeFigureOut">
               <a:rPr lang="en-US" smtClean="0"/>
-              <a:t>7/18/24</a:t>
+              <a:t>7/19/2024</a:t>
             </a:fld>
             <a:endParaRPr lang="en-US"/>
           </a:p>
@@ -1307,7 +1307,7 @@
           <a:p>
             <a:fld id="{E45D970C-F8D1-4E69-B2C1-46B399D34E86}" type="datetimeFigureOut">
               <a:rPr lang="en-US" smtClean="0"/>
-              <a:t>7/18/24</a:t>
+              <a:t>7/19/2024</a:t>
             </a:fld>
             <a:endParaRPr lang="en-US"/>
           </a:p>
@@ -1505,7 +1505,7 @@
           <a:p>
             <a:fld id="{E45D970C-F8D1-4E69-B2C1-46B399D34E86}" type="datetimeFigureOut">
               <a:rPr lang="en-US" smtClean="0"/>
-              <a:t>7/18/24</a:t>
+              <a:t>7/19/2024</a:t>
             </a:fld>
             <a:endParaRPr lang="en-US"/>
           </a:p>
@@ -1780,7 +1780,7 @@
           <a:p>
             <a:fld id="{E45D970C-F8D1-4E69-B2C1-46B399D34E86}" type="datetimeFigureOut">
               <a:rPr lang="en-US" smtClean="0"/>
-              <a:t>7/18/24</a:t>
+              <a:t>7/19/2024</a:t>
             </a:fld>
             <a:endParaRPr lang="en-US"/>
           </a:p>
@@ -2045,7 +2045,7 @@
           <a:p>
             <a:fld id="{E45D970C-F8D1-4E69-B2C1-46B399D34E86}" type="datetimeFigureOut">
               <a:rPr lang="en-US" smtClean="0"/>
-              <a:t>7/18/24</a:t>
+              <a:t>7/19/2024</a:t>
             </a:fld>
             <a:endParaRPr lang="en-US"/>
           </a:p>
@@ -2457,7 +2457,7 @@
           <a:p>
             <a:fld id="{E45D970C-F8D1-4E69-B2C1-46B399D34E86}" type="datetimeFigureOut">
               <a:rPr lang="en-US" smtClean="0"/>
-              <a:t>7/18/24</a:t>
+              <a:t>7/19/2024</a:t>
             </a:fld>
             <a:endParaRPr lang="en-US"/>
           </a:p>
@@ -2598,7 +2598,7 @@
           <a:p>
             <a:fld id="{E45D970C-F8D1-4E69-B2C1-46B399D34E86}" type="datetimeFigureOut">
               <a:rPr lang="en-US" smtClean="0"/>
-              <a:t>7/18/24</a:t>
+              <a:t>7/19/2024</a:t>
             </a:fld>
             <a:endParaRPr lang="en-US"/>
           </a:p>
@@ -2711,7 +2711,7 @@
           <a:p>
             <a:fld id="{E45D970C-F8D1-4E69-B2C1-46B399D34E86}" type="datetimeFigureOut">
               <a:rPr lang="en-US" smtClean="0"/>
-              <a:t>7/18/24</a:t>
+              <a:t>7/19/2024</a:t>
             </a:fld>
             <a:endParaRPr lang="en-US"/>
           </a:p>
@@ -3022,7 +3022,7 @@
           <a:p>
             <a:fld id="{E45D970C-F8D1-4E69-B2C1-46B399D34E86}" type="datetimeFigureOut">
               <a:rPr lang="en-US" smtClean="0"/>
-              <a:t>7/18/24</a:t>
+              <a:t>7/19/2024</a:t>
             </a:fld>
             <a:endParaRPr lang="en-US"/>
           </a:p>
@@ -3310,7 +3310,7 @@
           <a:p>
             <a:fld id="{E45D970C-F8D1-4E69-B2C1-46B399D34E86}" type="datetimeFigureOut">
               <a:rPr lang="en-US" smtClean="0"/>
-              <a:t>7/18/24</a:t>
+              <a:t>7/19/2024</a:t>
             </a:fld>
             <a:endParaRPr lang="en-US"/>
           </a:p>
@@ -3551,7 +3551,7 @@
           <a:p>
             <a:fld id="{E45D970C-F8D1-4E69-B2C1-46B399D34E86}" type="datetimeFigureOut">
               <a:rPr lang="en-US" smtClean="0"/>
-              <a:t>7/18/24</a:t>
+              <a:t>7/19/2024</a:t>
             </a:fld>
             <a:endParaRPr lang="en-US"/>
           </a:p>
@@ -11493,7 +11493,15 @@
             <a:pPr lvl="2"/>
             <a:r>
               <a:rPr lang="en-US" dirty="0"/>
-              <a:t>If we resize table when load factor hits a constant limit, this is amortized O(1)</a:t>
+              <a:t>If we resize table when load factor hits a constant limit, this </a:t>
+            </a:r>
+            <a:r>
+              <a:rPr lang="en-US"/>
+              <a:t>is O</a:t>
+            </a:r>
+            <a:r>
+              <a:rPr lang="en-US" dirty="0"/>
+              <a:t>(1)</a:t>
             </a:r>
           </a:p>
           <a:p>

</xml_diff>